<commit_message>
added material for support table upload to oracle
some rmd files for munging support tables..
</commit_message>
<xml_diff>
--- a/discard_schematic_112520.pptx
+++ b/discard_schematic_112520.pptx
@@ -5,8 +5,7 @@
     <p:sldMasterId id="2147483660" r:id="rId1"/>
   </p:sldMasterIdLst>
   <p:sldIdLst>
-    <p:sldId id="256" r:id="rId2"/>
-    <p:sldId id="257" r:id="rId3"/>
+    <p:sldId id="257" r:id="rId2"/>
   </p:sldIdLst>
   <p:sldSz cx="9144000" cy="6858000" type="screen4x3"/>
   <p:notesSz cx="6858000" cy="9144000"/>
@@ -940,11 +939,7 @@
           <a:pPr algn="l"/>
           <a:r>
             <a:rPr lang="en-US" dirty="0" smtClean="0"/>
-            <a:t>Define strata </a:t>
-          </a:r>
-          <a:r>
-            <a:rPr lang="en-US" dirty="0" smtClean="0"/>
-            <a:t>variables: </a:t>
+            <a:t>Define strata variables: </a:t>
           </a:r>
         </a:p>
         <a:p>
@@ -1017,11 +1012,7 @@
           </a:r>
           <a:r>
             <a:rPr lang="en-US" dirty="0" smtClean="0"/>
-            <a:t> </a:t>
-          </a:r>
-          <a:r>
-            <a:rPr lang="en-US" dirty="0" smtClean="0"/>
-            <a:t>data: get d/k for </a:t>
+            <a:t> data: get d/k for </a:t>
           </a:r>
         </a:p>
         <a:p>
@@ -1535,11 +1526,7 @@
         <a:p>
           <a:r>
             <a:rPr lang="en-US" dirty="0" smtClean="0"/>
-            <a:t>Apply stratification </a:t>
-          </a:r>
-          <a:r>
-            <a:rPr lang="en-US" dirty="0" smtClean="0"/>
-            <a:t>definition to Catch at </a:t>
+            <a:t>Apply stratification definition to Catch at </a:t>
           </a:r>
           <a:r>
             <a:rPr lang="en-US" dirty="0" err="1" smtClean="0"/>
@@ -2014,8 +2001,8 @@
     </dgm:pt>
   </dgm:ptLst>
   <dgm:cxnLst>
+    <dgm:cxn modelId="{EF8FBF1B-40DE-4CCE-A324-6C11376A6926}" type="presOf" srcId="{4C476D2F-DF5E-49C7-B5F8-EF125B0111EB}" destId="{B0B0754D-9D27-4867-8E8D-888EECF66D2E}" srcOrd="1" destOrd="0" presId="urn:microsoft.com/office/officeart/2005/8/layout/process5"/>
     <dgm:cxn modelId="{8049FB92-DA60-47D6-BB3C-BD87DFA6802A}" type="presOf" srcId="{71C8DEB9-7AE8-48FA-8E20-D27A389D8E58}" destId="{679947BB-EE38-46B0-97EE-3E04560C824E}" srcOrd="0" destOrd="1" presId="urn:microsoft.com/office/officeart/2005/8/layout/process5"/>
-    <dgm:cxn modelId="{EF8FBF1B-40DE-4CCE-A324-6C11376A6926}" type="presOf" srcId="{4C476D2F-DF5E-49C7-B5F8-EF125B0111EB}" destId="{B0B0754D-9D27-4867-8E8D-888EECF66D2E}" srcOrd="1" destOrd="0" presId="urn:microsoft.com/office/officeart/2005/8/layout/process5"/>
     <dgm:cxn modelId="{3DA319CB-EECC-488F-A51E-14E2E3DAA3C8}" type="presOf" srcId="{2456DC71-CE33-4E92-A356-B453D6EAFEA4}" destId="{2A238D4E-812E-4276-BC79-3982AE75940B}" srcOrd="0" destOrd="0" presId="urn:microsoft.com/office/officeart/2005/8/layout/process5"/>
     <dgm:cxn modelId="{A361146B-605D-43B3-87E7-CE48A3E7E060}" srcId="{AFEBBE14-6030-44F4-9AAC-04347B19DDFF}" destId="{462626DB-9507-4007-BF55-1EEACF503FA6}" srcOrd="6" destOrd="0" parTransId="{A7A56C61-FEA0-46F5-B3CB-85A1D1E4638D}" sibTransId="{836014EB-E3FA-46E5-BF15-2D855296BA9D}"/>
     <dgm:cxn modelId="{4454BC30-D440-4518-BBA1-75DFEE798CE8}" srcId="{AFEBBE14-6030-44F4-9AAC-04347B19DDFF}" destId="{8CB00271-920F-4470-9E46-BAF8DB6A5739}" srcOrd="9" destOrd="0" parTransId="{48724375-D5A6-4D60-9DD7-E332A69DD3BA}" sibTransId="{83762025-E082-41F2-8192-D483648BA286}"/>
@@ -2035,8 +2022,8 @@
     <dgm:cxn modelId="{D35DCD5D-A7A0-4CA3-AB1F-9AEFF20C4AE3}" srcId="{1AF08F38-1E11-4A16-9C61-D4CEF1AB8434}" destId="{CDB43846-D190-439E-B325-C650F6A5B64D}" srcOrd="0" destOrd="0" parTransId="{3311988A-3276-4913-9B03-CD9460A5B469}" sibTransId="{02EAFD03-C80B-4625-AE45-159E145C6731}"/>
     <dgm:cxn modelId="{CAAF8D5C-2613-4ABE-ACDF-BAD13169BBE5}" srcId="{AFEBBE14-6030-44F4-9AAC-04347B19DDFF}" destId="{C4D4C2AA-243E-4777-94DE-D84AB7D01F3B}" srcOrd="4" destOrd="0" parTransId="{3EDBFB46-F6E1-490C-B940-67918A577273}" sibTransId="{A0215EB4-991E-4194-8450-48691E3DCB83}"/>
     <dgm:cxn modelId="{690745B6-1BD2-4703-97B6-C053739CD66F}" type="presOf" srcId="{C4D4C2AA-243E-4777-94DE-D84AB7D01F3B}" destId="{542E92CC-0AC0-4662-B1BF-4F9D08482302}" srcOrd="0" destOrd="0" presId="urn:microsoft.com/office/officeart/2005/8/layout/process5"/>
+    <dgm:cxn modelId="{36F14279-3070-421F-84B0-5F3159643B10}" type="presOf" srcId="{E749AA81-A22B-44AC-8699-CDFCDEBA10E0}" destId="{A9B26DF7-5BC0-4053-8473-4A85C5D6BF5E}" srcOrd="0" destOrd="0" presId="urn:microsoft.com/office/officeart/2005/8/layout/process5"/>
     <dgm:cxn modelId="{C177072D-5F2F-4E0D-B7D0-38CF2E4D800A}" type="presOf" srcId="{4C476D2F-DF5E-49C7-B5F8-EF125B0111EB}" destId="{E4CBA98E-F68B-4094-81A3-1FF8B498EF6E}" srcOrd="0" destOrd="0" presId="urn:microsoft.com/office/officeart/2005/8/layout/process5"/>
-    <dgm:cxn modelId="{36F14279-3070-421F-84B0-5F3159643B10}" type="presOf" srcId="{E749AA81-A22B-44AC-8699-CDFCDEBA10E0}" destId="{A9B26DF7-5BC0-4053-8473-4A85C5D6BF5E}" srcOrd="0" destOrd="0" presId="urn:microsoft.com/office/officeart/2005/8/layout/process5"/>
     <dgm:cxn modelId="{25EBE1B1-ABFE-4333-B6EF-45BFDA77EA26}" type="presOf" srcId="{69EF35AA-79EF-4223-A4CF-4495E5AD48B5}" destId="{9ACF0091-C5F6-4DD4-924F-8C30B9DB953E}" srcOrd="0" destOrd="0" presId="urn:microsoft.com/office/officeart/2005/8/layout/process5"/>
     <dgm:cxn modelId="{1765103E-E992-477F-8937-95A28CF87323}" type="presOf" srcId="{1160C2BE-2CFB-4D72-A139-85996EF480CA}" destId="{B99AE0C0-AF34-491D-8022-EE0D2E1319C2}" srcOrd="0" destOrd="0" presId="urn:microsoft.com/office/officeart/2005/8/layout/process5"/>
     <dgm:cxn modelId="{5A0B0FE8-594E-41EE-AE5D-BD6537A3065E}" type="presOf" srcId="{2456DC71-CE33-4E92-A356-B453D6EAFEA4}" destId="{447E9B2F-E3D0-498C-A034-F17D78FBD133}" srcOrd="1" destOrd="0" presId="urn:microsoft.com/office/officeart/2005/8/layout/process5"/>
@@ -2321,11 +2308,7 @@
           </a:pPr>
           <a:r>
             <a:rPr lang="en-US" sz="800" kern="1200" dirty="0" smtClean="0"/>
-            <a:t>Define strata </a:t>
-          </a:r>
-          <a:r>
-            <a:rPr lang="en-US" sz="800" kern="1200" dirty="0" smtClean="0"/>
-            <a:t>variables: </a:t>
+            <a:t>Define strata variables: </a:t>
           </a:r>
         </a:p>
         <a:p>
@@ -2510,11 +2493,7 @@
           </a:r>
           <a:r>
             <a:rPr lang="en-US" sz="800" kern="1200" dirty="0" smtClean="0"/>
-            <a:t> </a:t>
-          </a:r>
-          <a:r>
-            <a:rPr lang="en-US" sz="800" kern="1200" dirty="0" smtClean="0"/>
-            <a:t>data: get d/k for </a:t>
+            <a:t> data: get d/k for </a:t>
           </a:r>
         </a:p>
         <a:p>
@@ -2704,11 +2683,7 @@
           </a:pPr>
           <a:r>
             <a:rPr lang="en-US" sz="800" kern="1200" dirty="0" smtClean="0"/>
-            <a:t>Apply stratification </a:t>
-          </a:r>
-          <a:r>
-            <a:rPr lang="en-US" sz="800" kern="1200" dirty="0" smtClean="0"/>
-            <a:t>definition to Catch at </a:t>
+            <a:t>Apply stratification definition to Catch at </a:t>
           </a:r>
           <a:r>
             <a:rPr lang="en-US" sz="800" kern="1200" dirty="0" err="1" smtClean="0"/>
@@ -5057,6 +5032,35 @@
     </dgm:style>
   </dgm:styleLbl>
 </dgm:styleDef>
+</file>
+
+<file path=ppt/ink/ink1.xml><?xml version="1.0" encoding="utf-8"?>
+<inkml:ink xmlns:inkml="http://www.w3.org/2003/InkML">
+  <inkml:definitions>
+    <inkml:context xml:id="ctx0">
+      <inkml:inkSource xml:id="inkSrc0">
+        <inkml:traceFormat>
+          <inkml:channel name="X" type="integer" min="-1920" max="1600" units="cm"/>
+          <inkml:channel name="Y" type="integer" max="1200" units="cm"/>
+          <inkml:channel name="T" type="integer" max="2.14748E9" units="dev"/>
+        </inkml:traceFormat>
+        <inkml:channelProperties>
+          <inkml:channelProperty channel="X" name="resolution" value="85.85366" units="1/cm"/>
+          <inkml:channelProperty channel="Y" name="resolution" value="38.70968" units="1/cm"/>
+          <inkml:channelProperty channel="T" name="resolution" value="1" units="1/dev"/>
+        </inkml:channelProperties>
+      </inkml:inkSource>
+      <inkml:timestamp xml:id="ts0" timeString="2020-11-25T18:22:47.994"/>
+    </inkml:context>
+    <inkml:brush xml:id="br0">
+      <inkml:brushProperty name="width" value="0.05292" units="cm"/>
+      <inkml:brushProperty name="height" value="0.05292" units="cm"/>
+      <inkml:brushProperty name="color" value="#0070C0"/>
+    </inkml:brush>
+  </inkml:definitions>
+  <inkml:trace contextRef="#ctx0" brushRef="#br0">13224 14542 0,'-32'-32'31,"16"32"-31,0 0 15,1 0-15,-128 0 16,111-16-16,-16 0 16,17 16-16,-17 0 0,0 0 15,17 0-15,-890 0 16,794 0 0,0-16-16,16 0 0,-16 16 0,0-16 15,16 1-15,-1-1 0,1 0 0,-444-143 31,444 127-31,31 1 16,17 15-16,-17-16 0,17 0 0,-32-15 16,47 15-1,16 0-15,16 0 0,-15 1 16,-1-17 0,16 16-16,-111-127 31,111 144-31,0-17 0,0 0 0,0 0 15,-63-142 1,63 126 0,0 0-16,16 17 0,-16-17 0,16 32 15,-15-16-15,15 1 0,0-477 32,0 428-32,0 17 0,0-1 15,0-31-15,0 32 0,0-223 16,0 206-16,0-47 15,0 48-15,15 16 0,17-17 16,-16 17-16,0-1 0,16 1 0,95-366 31,-96 381-31,-15-15 16,16-1-16,16-15 0,-17 31 0,-15 1 16,127-144-1,-95 144-15,47-49 16,-47 33-16,-1 31 0,64-47 0,223-159 15,-239 206 1,80-32-16,-96 17 0,96-1 16,-64 16-16,0 17 0,-16-1 0,48-32 15,0 16-15,16 16 0,31 1 16,17-17-16,1078-143 16,-1015 159-16,222 0 15,-222 16-15,-47 0 0,554 0 16,-538 0-16,1221 0 31,-1222 0-31,-16 0 0,64 64 16,365 15-16,-429-31 15,175 0-15,-32-1 16,-190-15-16,0 0 0,-33 31 0,17-31 16,-16 0-16,508 206 15,-508-191 1,-16 17-16,16-1 0,0 1 0,15 15 15,1-15-15,365 110 16,-175-47-16,-174-79 0,-1 0 0,-15 15 16,0-15-16,0-16 0,15 15 15,-31 17-15,16-33 0,349 128 16,-397-127-16,0 0 16,0-1-16,-15 17 0,-1 0 0,0-1 15,0 1-15,-79 15 0,-16 112 31,0-127-31,0-17 0,0 17 0,0-16 16,0-16-16,0 15 0,0 255 31,0-175-31,0 127 16,0-142-16,0-1 0,0 349 31,0-364-31,0 94 0,0-78 16,0-1-16,0 0 0,0 0 0,0 429 31,0-301-31,0-128 16,0 32-16,0-16 0,0 0 0,0 0 15,0-16-15,-111 588 32,79-556-32,-31 143 0,-48-16 15,63-127-15,-15 0 0,15 0 0,-158 302 31,-33-48-31,192-302 16,-1 16-16,1 0 0,-1-15 16,0-1-16,-15 1 0,31-1 0,-301 365 31,285-364-31,-15-33 0,-64 112 16,63-159-1,48 0-15,-16 0 0,1 0 0,-1 0 16,0 0-16,16 0 0,-111 0 15,111 0 1,1 0-16,-17 0 0,16 0 0,-32 0 0,32 0 16,1 0-16,-160 0 15,111 0 1,1 0-16,31 0 0,0 0 16,-47 0-16,47 0 15,-15 0-15,15 0 0,-16 0 0,17 0 16,-112 0-1,111 0-15,-16 0 0,-47 0 16,47 0-16,17 0 0,-17 0 0,-15 0 16,31 0-16,-111 0 0,0 0 15,64 0-15,-334 0 16,334 0-16,-1 0 0,-15 0 16,31 0-16,-15 0 0,16 0 0,-1 0 15,-15 0-15,15 0 0,1 0 0,-1 0 16,-412-95-1,412 63-15,-78 16 16,62-15-16,17-1 0,-1 16 16,-79-32-16,64 48 0,15-16 15,-444-142 1,429 142 0,31 0-16,1 0 0,-48-16 15,63 16-15,-79-63 31,79 47-31,16 32 0,0-16 16,0 1-16,0-1 0,1 0 16,-1 16-16,-16-80 15,32 65-15,-32-17 0,0-16 16,-15 1 0,15-1-16,0 32 15,-15-47-15,47 47 16,-32-16-16,16 0 0,0 16 0,0 0 15,16 1-15,-47-17 16,47 16 0,-32 0-16,16 0 0,16 0 0,-16 16 15,16-16-15,-16 16 0,-31-31 16,15 15 0,16 16-16,-63-32 15,31 32-15,32-16 16,-16 0-16,17 0 15,-17-15-15,0 31 0,0-48 32,16 48-32,-15-32 0,15 32 0,0-16 0,-48-63 47,33 31-47,-1 1 15,16 47-15,0-32 0,16 16 0,0 0 16,-63-95-1,47 95 1,0 0-16,16-15 0,0 15 0,-16-16 16,0 0-16,16 1 0,-63-65 15,47 80 1,16-15-16,-32-1 0,32 0 0,-32 0 16,32 1-16,-16-1 0,-15-32 15,-17 17-15,32 15 16,-16 0-16,1 1 0,31 15 0,-111-80 31,95 65-31,-32-17 16,16 16-1,1 16-15,31 1 0,-16-1 16,-16-16-16,16 16 0,-16-16 16,16 16-16,-31-31 15,15 15-15,16 16 16,0 0-16,0 0 0,1 1 15,-65-81 1,64 80 0,-15-15-16,15 15 0,0 0 15,-48-32 1,64 32-16,-31-15 0,-33-17 16,48 32-1,0 16-15,0-32 0,-47-31 16,31 47-1,0-16-15,1 1 0,-1 15 16,16 0-16,-63-16 16,63 16-16,-16 0 15,16 16-15,-16-31 0,17 31 0,-17 0 16,32-16-16,-32-16 0,16 32 0,-79-64 31,47 49-31,32-1 0,-15 0 16,-17-16-16,-79-31 31,48 31-31,63 16 0,0 0 16,-79-16-1,31 1 1,17 15-16,31 0 0,-16 0 0,-47-16 16,-80-47 15,111 47-16,32 32-15,-63-32 16,63 32 0,0-16-16,0 16 0,-15-15 0,15 15 0,0 0 15,-16-16-15,16 16 0,-16-16 16,17 16-16,-17-16 0,-16 0 16,-47 0 15,47-16-16,32 32-15,-15 0 0,15-15 16,0 15-16,-16-16 16,16 16-1,0 0-15,-15-16 16,-17-16 15,32 32-31,0 0 16,0 0-16,1-16 15,-1 16-15,0 0 0,-32 0 32,32 0-32,0 0 0,1 0 0,-1 0 15,-64 0-15,1 0 32,63 0-32,-16 0 15,16 0 1,1 0 31,-1 0-16,0 0-31,0 0 16,0 0-1,0 0 1,16 16-16,-32 0 31,32 0-15,-15-16-1,15 16-15</inkml:trace>
+  <inkml:trace contextRef="#ctx0" brushRef="#br0" timeOffset="682239.5966">24717 3270 0</inkml:trace>
+</inkml:ink>
 </file>
 
 <file path=ppt/slideLayouts/slideLayout1.xml><?xml version="1.0" encoding="utf-8"?>
@@ -7918,74 +7922,6 @@
           <a:chExt cx="0" cy="0"/>
         </a:xfrm>
       </p:grpSpPr>
-      <p:sp>
-        <p:nvSpPr>
-          <p:cNvPr id="2" name="Title 1"/>
-          <p:cNvSpPr>
-            <a:spLocks noGrp="1"/>
-          </p:cNvSpPr>
-          <p:nvPr>
-            <p:ph type="ctrTitle"/>
-          </p:nvPr>
-        </p:nvSpPr>
-        <p:spPr/>
-        <p:txBody>
-          <a:bodyPr/>
-          <a:lstStyle/>
-          <a:p>
-            <a:endParaRPr lang="en-US"/>
-          </a:p>
-        </p:txBody>
-      </p:sp>
-      <p:sp>
-        <p:nvSpPr>
-          <p:cNvPr id="3" name="Subtitle 2"/>
-          <p:cNvSpPr>
-            <a:spLocks noGrp="1"/>
-          </p:cNvSpPr>
-          <p:nvPr>
-            <p:ph type="subTitle" idx="1"/>
-          </p:nvPr>
-        </p:nvSpPr>
-        <p:spPr/>
-        <p:txBody>
-          <a:bodyPr/>
-          <a:lstStyle/>
-          <a:p>
-            <a:endParaRPr lang="en-US"/>
-          </a:p>
-        </p:txBody>
-      </p:sp>
-    </p:spTree>
-    <p:extLst>
-      <p:ext uri="{BB962C8B-B14F-4D97-AF65-F5344CB8AC3E}">
-        <p14:creationId xmlns:p14="http://schemas.microsoft.com/office/powerpoint/2010/main" val="2182783933"/>
-      </p:ext>
-    </p:extLst>
-  </p:cSld>
-  <p:clrMapOvr>
-    <a:masterClrMapping/>
-  </p:clrMapOvr>
-</p:sld>
-</file>
-
-<file path=ppt/slides/slide2.xml><?xml version="1.0" encoding="utf-8"?>
-<p:sld xmlns:a="http://schemas.openxmlformats.org/drawingml/2006/main" xmlns:r="http://schemas.openxmlformats.org/officeDocument/2006/relationships" xmlns:p="http://schemas.openxmlformats.org/presentationml/2006/main">
-  <p:cSld>
-    <p:spTree>
-      <p:nvGrpSpPr>
-        <p:cNvPr id="1" name=""/>
-        <p:cNvGrpSpPr/>
-        <p:nvPr/>
-      </p:nvGrpSpPr>
-      <p:grpSpPr>
-        <a:xfrm>
-          <a:off x="0" y="0"/>
-          <a:ext cx="0" cy="0"/>
-          <a:chOff x="0" y="0"/>
-          <a:chExt cx="0" cy="0"/>
-        </a:xfrm>
-      </p:grpSpPr>
       <p:graphicFrame>
         <p:nvGraphicFramePr>
           <p:cNvPr id="4" name="Diagram 3"/>
@@ -8008,6 +7944,45 @@
           </a:graphicData>
         </a:graphic>
       </p:graphicFrame>
+      <mc:AlternateContent xmlns:mc="http://schemas.openxmlformats.org/markup-compatibility/2006">
+        <mc:Choice xmlns:p14="http://schemas.microsoft.com/office/powerpoint/2010/main" Requires="p14">
+          <p:contentPart p14:bwMode="auto" r:id="rId7">
+            <p14:nvContentPartPr>
+              <p14:cNvPr id="2" name="Ink 1"/>
+              <p14:cNvContentPartPr/>
+              <p14:nvPr/>
+            </p14:nvContentPartPr>
+            <p14:xfrm>
+              <a:off x="3360600" y="1177200"/>
+              <a:ext cx="5778000" cy="5675400"/>
+            </p14:xfrm>
+          </p:contentPart>
+        </mc:Choice>
+        <mc:Fallback>
+          <p:pic>
+            <p:nvPicPr>
+              <p:cNvPr id="2" name="Ink 1"/>
+              <p:cNvPicPr/>
+              <p:nvPr/>
+            </p:nvPicPr>
+            <p:blipFill>
+              <a:blip r:embed="rId8"/>
+              <a:stretch>
+                <a:fillRect/>
+              </a:stretch>
+            </p:blipFill>
+            <p:spPr>
+              <a:xfrm>
+                <a:off x="3351240" y="1167840"/>
+                <a:ext cx="5796720" cy="5694120"/>
+              </a:xfrm>
+              <a:prstGeom prst="rect">
+                <a:avLst/>
+              </a:prstGeom>
+            </p:spPr>
+          </p:pic>
+        </mc:Fallback>
+      </mc:AlternateContent>
     </p:spTree>
     <p:extLst>
       <p:ext uri="{BB962C8B-B14F-4D97-AF65-F5344CB8AC3E}">

</xml_diff>